<commit_message>
Pptx done. Code done.
</commit_message>
<xml_diff>
--- a/Flood-Fill Algorithm for Maze Solving.pptx
+++ b/Flood-Fill Algorithm for Maze Solving.pptx
@@ -5,7 +5,7 @@
     <p:sldMasterId id="2147483648" r:id="rId1"/>
   </p:sldMasterIdLst>
   <p:notesMasterIdLst>
-    <p:notesMasterId r:id="rId18"/>
+    <p:notesMasterId r:id="rId19"/>
   </p:notesMasterIdLst>
   <p:sldIdLst>
     <p:sldId id="256" r:id="rId6"/>
@@ -20,29 +20,26 @@
     <p:sldId id="265" r:id="rId15"/>
     <p:sldId id="266" r:id="rId16"/>
     <p:sldId id="267" r:id="rId17"/>
+    <p:sldId id="268" r:id="rId18"/>
   </p:sldIdLst>
   <p:sldSz cx="18288000" cy="10287000"/>
   <p:notesSz cx="6858000" cy="9144000"/>
   <p:embeddedFontLst>
     <p:embeddedFont>
       <p:font typeface="IBM Plex Mono Bold" charset="1" panose="020B0809050203000203"/>
-      <p:regular r:id="rId21"/>
+      <p:regular r:id="rId22"/>
     </p:embeddedFont>
     <p:embeddedFont>
       <p:font typeface="Arimo" charset="1" panose="020B0604020202020204"/>
-      <p:regular r:id="rId22"/>
+      <p:regular r:id="rId23"/>
     </p:embeddedFont>
     <p:embeddedFont>
       <p:font typeface="Dreaming Outloud Script Italics" charset="1" panose="00000500000000000000"/>
-      <p:regular r:id="rId23"/>
+      <p:regular r:id="rId24"/>
     </p:embeddedFont>
     <p:embeddedFont>
       <p:font typeface="Joint" charset="1" panose="00000000000000000000"/>
-      <p:regular r:id="rId24"/>
-    </p:embeddedFont>
-    <p:embeddedFont>
-      <p:font typeface="Arimo Bold" charset="1" panose="020B0704020202020204"/>
-      <p:regular r:id="rId33"/>
+      <p:regular r:id="rId25"/>
     </p:embeddedFont>
   </p:embeddedFontLst>
   <p:defaultTextStyle>
@@ -6363,6 +6360,395 @@
       </p:grpSp>
       <p:sp>
         <p:nvSpPr>
+          <p:cNvPr name="Freeform 4" id="4"/>
+          <p:cNvSpPr/>
+          <p:nvPr/>
+        </p:nvSpPr>
+        <p:spPr>
+          <a:xfrm flipH="false" flipV="false" rot="-5400000">
+            <a:off x="14597226" y="-567430"/>
+            <a:ext cx="3720248" cy="3915300"/>
+          </a:xfrm>
+          <a:custGeom>
+            <a:avLst/>
+            <a:gdLst/>
+            <a:ahLst/>
+            <a:cxnLst/>
+            <a:rect r="r" b="b" t="t" l="l"/>
+            <a:pathLst>
+              <a:path h="3915300" w="3720248">
+                <a:moveTo>
+                  <a:pt x="0" y="0"/>
+                </a:moveTo>
+                <a:lnTo>
+                  <a:pt x="3720248" y="0"/>
+                </a:lnTo>
+                <a:lnTo>
+                  <a:pt x="3720248" y="3915300"/>
+                </a:lnTo>
+                <a:lnTo>
+                  <a:pt x="0" y="3915300"/>
+                </a:lnTo>
+                <a:lnTo>
+                  <a:pt x="0" y="0"/>
+                </a:lnTo>
+                <a:close/>
+              </a:path>
+            </a:pathLst>
+          </a:custGeom>
+          <a:blipFill>
+            <a:blip r:embed="rId3"/>
+            <a:stretch>
+              <a:fillRect l="0" t="0" r="0" b="0"/>
+            </a:stretch>
+          </a:blipFill>
+        </p:spPr>
+      </p:sp>
+      <p:sp>
+        <p:nvSpPr>
+          <p:cNvPr name="Freeform 5" id="5"/>
+          <p:cNvSpPr/>
+          <p:nvPr/>
+        </p:nvSpPr>
+        <p:spPr>
+          <a:xfrm flipH="false" flipV="false" rot="-10800000">
+            <a:off x="365404" y="9343840"/>
+            <a:ext cx="2222302" cy="864466"/>
+          </a:xfrm>
+          <a:custGeom>
+            <a:avLst/>
+            <a:gdLst/>
+            <a:ahLst/>
+            <a:cxnLst/>
+            <a:rect r="r" b="b" t="t" l="l"/>
+            <a:pathLst>
+              <a:path h="864466" w="2222302">
+                <a:moveTo>
+                  <a:pt x="0" y="0"/>
+                </a:moveTo>
+                <a:lnTo>
+                  <a:pt x="2222302" y="0"/>
+                </a:lnTo>
+                <a:lnTo>
+                  <a:pt x="2222302" y="864466"/>
+                </a:lnTo>
+                <a:lnTo>
+                  <a:pt x="0" y="864466"/>
+                </a:lnTo>
+                <a:lnTo>
+                  <a:pt x="0" y="0"/>
+                </a:lnTo>
+                <a:close/>
+              </a:path>
+            </a:pathLst>
+          </a:custGeom>
+          <a:blipFill>
+            <a:blip r:embed="rId4"/>
+            <a:stretch>
+              <a:fillRect l="0" t="0" r="-107369" b="-3"/>
+            </a:stretch>
+          </a:blipFill>
+        </p:spPr>
+      </p:sp>
+      <p:sp>
+        <p:nvSpPr>
+          <p:cNvPr name="Freeform 6" id="6"/>
+          <p:cNvSpPr/>
+          <p:nvPr/>
+        </p:nvSpPr>
+        <p:spPr>
+          <a:xfrm flipH="false" flipV="false" rot="-10800000">
+            <a:off x="365406" y="9098744"/>
+            <a:ext cx="2637328" cy="864513"/>
+          </a:xfrm>
+          <a:custGeom>
+            <a:avLst/>
+            <a:gdLst/>
+            <a:ahLst/>
+            <a:cxnLst/>
+            <a:rect r="r" b="b" t="t" l="l"/>
+            <a:pathLst>
+              <a:path h="864513" w="2637328">
+                <a:moveTo>
+                  <a:pt x="0" y="0"/>
+                </a:moveTo>
+                <a:lnTo>
+                  <a:pt x="2637328" y="0"/>
+                </a:lnTo>
+                <a:lnTo>
+                  <a:pt x="2637328" y="864513"/>
+                </a:lnTo>
+                <a:lnTo>
+                  <a:pt x="0" y="864513"/>
+                </a:lnTo>
+                <a:lnTo>
+                  <a:pt x="0" y="0"/>
+                </a:lnTo>
+                <a:close/>
+              </a:path>
+            </a:pathLst>
+          </a:custGeom>
+          <a:blipFill>
+            <a:blip r:embed="rId4"/>
+            <a:stretch>
+              <a:fillRect l="0" t="2239" r="-74739" b="-2239"/>
+            </a:stretch>
+          </a:blipFill>
+        </p:spPr>
+      </p:sp>
+      <p:sp>
+        <p:nvSpPr>
+          <p:cNvPr name="Freeform 7" id="7"/>
+          <p:cNvSpPr/>
+          <p:nvPr/>
+        </p:nvSpPr>
+        <p:spPr>
+          <a:xfrm flipH="true" flipV="false" rot="0">
+            <a:off x="10591798" y="7662400"/>
+            <a:ext cx="7708902" cy="2624600"/>
+          </a:xfrm>
+          <a:custGeom>
+            <a:avLst/>
+            <a:gdLst/>
+            <a:ahLst/>
+            <a:cxnLst/>
+            <a:rect r="r" b="b" t="t" l="l"/>
+            <a:pathLst>
+              <a:path h="2624600" w="7708902">
+                <a:moveTo>
+                  <a:pt x="7708902" y="0"/>
+                </a:moveTo>
+                <a:lnTo>
+                  <a:pt x="0" y="0"/>
+                </a:lnTo>
+                <a:lnTo>
+                  <a:pt x="0" y="2624600"/>
+                </a:lnTo>
+                <a:lnTo>
+                  <a:pt x="7708902" y="2624600"/>
+                </a:lnTo>
+                <a:lnTo>
+                  <a:pt x="7708902" y="0"/>
+                </a:lnTo>
+                <a:close/>
+              </a:path>
+            </a:pathLst>
+          </a:custGeom>
+          <a:blipFill>
+            <a:blip r:embed="rId5"/>
+            <a:stretch>
+              <a:fillRect l="-1979" t="0" r="0" b="-9522"/>
+            </a:stretch>
+          </a:blipFill>
+        </p:spPr>
+      </p:sp>
+      <p:sp>
+        <p:nvSpPr>
+          <p:cNvPr name="TextBox 8" id="8"/>
+          <p:cNvSpPr txBox="true"/>
+          <p:nvPr/>
+        </p:nvSpPr>
+        <p:spPr>
+          <a:xfrm rot="0">
+            <a:off x="1531425" y="1584725"/>
+            <a:ext cx="9527550" cy="948309"/>
+          </a:xfrm>
+          <a:prstGeom prst="rect">
+            <a:avLst/>
+          </a:prstGeom>
+        </p:spPr>
+        <p:txBody>
+          <a:bodyPr anchor="t" rtlCol="false" tIns="0" lIns="0" bIns="0" rIns="0">
+            <a:spAutoFit/>
+          </a:bodyPr>
+          <a:lstStyle/>
+          <a:p>
+            <a:pPr algn="l">
+              <a:lnSpc>
+                <a:spcPts val="7727"/>
+              </a:lnSpc>
+            </a:pPr>
+            <a:r>
+              <a:rPr lang="en-US" sz="5599">
+                <a:solidFill>
+                  <a:srgbClr val="1F164D"/>
+                </a:solidFill>
+                <a:latin typeface="IBM Plex Mono Bold"/>
+              </a:rPr>
+              <a:t>Conclusions</a:t>
+            </a:r>
+          </a:p>
+        </p:txBody>
+      </p:sp>
+      <p:sp>
+        <p:nvSpPr>
+          <p:cNvPr name="TextBox 9" id="9"/>
+          <p:cNvSpPr txBox="true"/>
+          <p:nvPr/>
+        </p:nvSpPr>
+        <p:spPr>
+          <a:xfrm rot="0">
+            <a:off x="1531425" y="3996850"/>
+            <a:ext cx="15380365" cy="4374642"/>
+          </a:xfrm>
+          <a:prstGeom prst="rect">
+            <a:avLst/>
+          </a:prstGeom>
+        </p:spPr>
+        <p:txBody>
+          <a:bodyPr anchor="t" rtlCol="false" tIns="0" lIns="0" bIns="0" rIns="0">
+            <a:spAutoFit/>
+          </a:bodyPr>
+          <a:lstStyle/>
+          <a:p>
+            <a:pPr algn="just">
+              <a:lnSpc>
+                <a:spcPts val="3863"/>
+              </a:lnSpc>
+            </a:pPr>
+            <a:r>
+              <a:rPr lang="en-US" sz="2799">
+                <a:solidFill>
+                  <a:srgbClr val="1F164D"/>
+                </a:solidFill>
+                <a:latin typeface="Arimo"/>
+              </a:rPr>
+              <a:t>Motors’ speed callibration, adjustments via coding, dust and floor conditions obstructs both the effectiveness of the robot’s repositioning and the time computation of the algorithm.</a:t>
+            </a:r>
+          </a:p>
+          <a:p>
+            <a:pPr algn="just">
+              <a:lnSpc>
+                <a:spcPts val="3863"/>
+              </a:lnSpc>
+            </a:pPr>
+            <a:r>
+              <a:rPr lang="en-US" sz="2799">
+                <a:solidFill>
+                  <a:srgbClr val="1F164D"/>
+                </a:solidFill>
+                <a:latin typeface="Arimo"/>
+              </a:rPr>
+              <a:t>In comparison with other algorithms to find the shortest path to solve a maze, this algorithm guarantees us to find it efficiently via feedback control implementation based on sensors’ data given and storaged in the 2D representation of the maze.</a:t>
+            </a:r>
+          </a:p>
+          <a:p>
+            <a:pPr algn="just">
+              <a:lnSpc>
+                <a:spcPts val="3863"/>
+              </a:lnSpc>
+            </a:pPr>
+            <a:r>
+              <a:rPr lang="en-US" sz="2799">
+                <a:solidFill>
+                  <a:srgbClr val="1F164D"/>
+                </a:solidFill>
+                <a:latin typeface="Arimo"/>
+              </a:rPr>
+              <a:t>The usage of an Arduino Nano allows us to reduce the size of the robot in future related implementations and also gives the opportunity to include more sensors and modules to ensure a better control of the robot’s repositioning and increase its efficiency.</a:t>
+            </a:r>
+          </a:p>
+          <a:p>
+            <a:pPr algn="r">
+              <a:lnSpc>
+                <a:spcPts val="3863"/>
+              </a:lnSpc>
+            </a:pPr>
+          </a:p>
+        </p:txBody>
+      </p:sp>
+    </p:spTree>
+  </p:cSld>
+  <p:clrMapOvr>
+    <a:masterClrMapping/>
+  </p:clrMapOvr>
+</p:sld>
+</file>
+
+<file path=ppt/slides/slide11.xml><?xml version="1.0" encoding="utf-8"?>
+<p:sld xmlns:p="http://schemas.openxmlformats.org/presentationml/2006/main" xmlns:a="http://schemas.openxmlformats.org/drawingml/2006/main" xmlns:r="http://schemas.openxmlformats.org/officeDocument/2006/relationships">
+  <p:cSld>
+    <p:bg>
+      <p:bgPr>
+        <a:solidFill>
+          <a:srgbClr val="130994"/>
+        </a:solidFill>
+      </p:bgPr>
+    </p:bg>
+    <p:spTree>
+      <p:nvGrpSpPr>
+        <p:cNvPr id="1" name=""/>
+        <p:cNvGrpSpPr/>
+        <p:nvPr/>
+      </p:nvGrpSpPr>
+      <p:grpSpPr>
+        <a:xfrm>
+          <a:off x="0" y="0"/>
+          <a:ext cx="0" cy="0"/>
+          <a:chOff x="0" y="0"/>
+          <a:chExt cx="0" cy="0"/>
+        </a:xfrm>
+      </p:grpSpPr>
+      <p:grpSp>
+        <p:nvGrpSpPr>
+          <p:cNvPr name="Group 2" id="2"/>
+          <p:cNvGrpSpPr/>
+          <p:nvPr/>
+        </p:nvGrpSpPr>
+        <p:grpSpPr>
+          <a:xfrm rot="0">
+            <a:off x="365400" y="303300"/>
+            <a:ext cx="17557200" cy="9680400"/>
+            <a:chOff x="0" y="0"/>
+            <a:chExt cx="23409600" cy="12907200"/>
+          </a:xfrm>
+        </p:grpSpPr>
+        <p:sp>
+          <p:nvSpPr>
+            <p:cNvPr name="Freeform 3" id="3"/>
+            <p:cNvSpPr/>
+            <p:nvPr/>
+          </p:nvSpPr>
+          <p:spPr>
+            <a:xfrm flipH="false" flipV="false" rot="0">
+              <a:off x="0" y="0"/>
+              <a:ext cx="23409529" cy="12907137"/>
+            </a:xfrm>
+            <a:custGeom>
+              <a:avLst/>
+              <a:gdLst/>
+              <a:ahLst/>
+              <a:cxnLst/>
+              <a:rect r="r" b="b" t="t" l="l"/>
+              <a:pathLst>
+                <a:path h="12907137" w="23409529">
+                  <a:moveTo>
+                    <a:pt x="0" y="0"/>
+                  </a:moveTo>
+                  <a:lnTo>
+                    <a:pt x="22830155" y="0"/>
+                  </a:lnTo>
+                  <a:lnTo>
+                    <a:pt x="23409529" y="579374"/>
+                  </a:lnTo>
+                  <a:lnTo>
+                    <a:pt x="23409529" y="12907137"/>
+                  </a:lnTo>
+                  <a:lnTo>
+                    <a:pt x="0" y="12907137"/>
+                  </a:lnTo>
+                  <a:close/>
+                </a:path>
+              </a:pathLst>
+            </a:custGeom>
+            <a:solidFill>
+              <a:srgbClr val="F9F9F9"/>
+            </a:solidFill>
+          </p:spPr>
+        </p:sp>
+      </p:grpSp>
+      <p:sp>
+        <p:nvSpPr>
           <p:cNvPr name="AutoShape 4" id="4"/>
           <p:cNvSpPr/>
           <p:nvPr/>
@@ -6624,8 +7010,8 @@
         </p:nvSpPr>
         <p:spPr>
           <a:xfrm rot="0">
-            <a:off x="1531425" y="4424350"/>
-            <a:ext cx="3775950" cy="707025"/>
+            <a:off x="1531425" y="4028123"/>
+            <a:ext cx="3775950" cy="1241679"/>
           </a:xfrm>
           <a:prstGeom prst="rect">
             <a:avLst/>
@@ -6649,7 +7035,7 @@
                 </a:solidFill>
                 <a:latin typeface="IBM Plex Mono Bold"/>
               </a:rPr>
-              <a:t>MERKUR</a:t>
+              <a:t>Hardware additions</a:t>
             </a:r>
           </a:p>
         </p:txBody>
@@ -6662,8 +7048,8 @@
         </p:nvSpPr>
         <p:spPr>
           <a:xfrm rot="0">
-            <a:off x="7268727" y="4424350"/>
-            <a:ext cx="3775950" cy="707025"/>
+            <a:off x="7268727" y="4028123"/>
+            <a:ext cx="3775950" cy="1241679"/>
           </a:xfrm>
           <a:prstGeom prst="rect">
             <a:avLst/>
@@ -6687,7 +7073,7 @@
                 </a:solidFill>
                 <a:latin typeface="IBM Plex Mono Bold"/>
               </a:rPr>
-              <a:t>VENUS</a:t>
+              <a:t>Best path for a maze</a:t>
             </a:r>
           </a:p>
         </p:txBody>
@@ -6700,8 +7086,8 @@
         </p:nvSpPr>
         <p:spPr>
           <a:xfrm rot="0">
-            <a:off x="1531425" y="5095152"/>
-            <a:ext cx="3775950" cy="1914825"/>
+            <a:off x="1531425" y="5203127"/>
+            <a:ext cx="3775950" cy="974217"/>
           </a:xfrm>
           <a:prstGeom prst="rect">
             <a:avLst/>
@@ -6725,40 +7111,9 @@
                 </a:solidFill>
                 <a:latin typeface="Arimo"/>
               </a:rPr>
-              <a:t>Merkur ist der sonnennächste </a:t>
-            </a:r>
-            <a:r>
-              <a:rPr lang="en-US" sz="2799">
-                <a:solidFill>
-                  <a:srgbClr val="1F164D"/>
-                </a:solidFill>
-                <a:latin typeface="Arimo Bold"/>
-              </a:rPr>
-              <a:t>Planet und der kleinste von allen</a:t>
-            </a:r>
-          </a:p>
-        </p:txBody>
-      </p:sp>
-      <p:sp>
-        <p:nvSpPr>
-          <p:cNvPr name="TextBox 13" id="13"/>
-          <p:cNvSpPr txBox="true"/>
-          <p:nvPr/>
-        </p:nvSpPr>
-        <p:spPr>
-          <a:xfrm rot="0">
-            <a:off x="7268721" y="5095152"/>
-            <a:ext cx="3775950" cy="1914825"/>
-          </a:xfrm>
-          <a:prstGeom prst="rect">
-            <a:avLst/>
-          </a:prstGeom>
-        </p:spPr>
-        <p:txBody>
-          <a:bodyPr anchor="t" rtlCol="false" tIns="0" lIns="0" bIns="0" rIns="0">
-            <a:spAutoFit/>
-          </a:bodyPr>
-          <a:lstStyle/>
+              <a:t>4 ultrasonic sensors</a:t>
+            </a:r>
+          </a:p>
           <a:p>
             <a:pPr algn="l">
               <a:lnSpc>
@@ -6772,21 +7127,21 @@
                 </a:solidFill>
                 <a:latin typeface="Arimo"/>
               </a:rPr>
-              <a:t>Die Venus ist der zweite Planet des Sonnensystems und der drittkleinste</a:t>
-            </a:r>
-          </a:p>
-        </p:txBody>
-      </p:sp>
-      <p:sp>
-        <p:nvSpPr>
-          <p:cNvPr name="TextBox 14" id="14"/>
+              <a:t>1 MPU 6050</a:t>
+            </a:r>
+          </a:p>
+        </p:txBody>
+      </p:sp>
+      <p:sp>
+        <p:nvSpPr>
+          <p:cNvPr name="TextBox 13" id="13"/>
           <p:cNvSpPr txBox="true"/>
           <p:nvPr/>
         </p:nvSpPr>
         <p:spPr>
           <a:xfrm rot="0">
-            <a:off x="12980629" y="5095152"/>
-            <a:ext cx="3775950" cy="1914825"/>
+            <a:off x="7268727" y="5203127"/>
+            <a:ext cx="3775950" cy="974217"/>
           </a:xfrm>
           <a:prstGeom prst="rect">
             <a:avLst/>
@@ -6810,17 +7165,37 @@
                 </a:solidFill>
                 <a:latin typeface="Arimo"/>
               </a:rPr>
-              <a:t>Jupiter ist ein Gasriese und </a:t>
-            </a:r>
-            <a:r>
-              <a:rPr lang="en-US" sz="2799">
-                <a:solidFill>
-                  <a:srgbClr val="1F164D"/>
-                </a:solidFill>
-                <a:latin typeface="Arimo Bold"/>
-              </a:rPr>
-              <a:t>der größte Planet</a:t>
-            </a:r>
+              <a:t>Finding the maze fastest / shortest path</a:t>
+            </a:r>
+          </a:p>
+        </p:txBody>
+      </p:sp>
+      <p:sp>
+        <p:nvSpPr>
+          <p:cNvPr name="TextBox 14" id="14"/>
+          <p:cNvSpPr txBox="true"/>
+          <p:nvPr/>
+        </p:nvSpPr>
+        <p:spPr>
+          <a:xfrm rot="0">
+            <a:off x="12512406" y="5095152"/>
+            <a:ext cx="4478286" cy="1945767"/>
+          </a:xfrm>
+          <a:prstGeom prst="rect">
+            <a:avLst/>
+          </a:prstGeom>
+        </p:spPr>
+        <p:txBody>
+          <a:bodyPr anchor="t" rtlCol="false" tIns="0" lIns="0" bIns="0" rIns="0">
+            <a:spAutoFit/>
+          </a:bodyPr>
+          <a:lstStyle/>
+          <a:p>
+            <a:pPr algn="l">
+              <a:lnSpc>
+                <a:spcPts val="3863"/>
+              </a:lnSpc>
+            </a:pPr>
             <a:r>
               <a:rPr lang="en-US" sz="2799">
                 <a:solidFill>
@@ -6828,7 +7203,55 @@
                 </a:solidFill>
                 <a:latin typeface="Arimo"/>
               </a:rPr>
-              <a:t> in unserem Sonnensystem</a:t>
+              <a:t>IR sensors as replacements</a:t>
+            </a:r>
+          </a:p>
+          <a:p>
+            <a:pPr algn="l">
+              <a:lnSpc>
+                <a:spcPts val="3863"/>
+              </a:lnSpc>
+            </a:pPr>
+            <a:r>
+              <a:rPr lang="en-US" sz="2799">
+                <a:solidFill>
+                  <a:srgbClr val="1F164D"/>
+                </a:solidFill>
+                <a:latin typeface="Arimo"/>
+              </a:rPr>
+              <a:t>Robot resizing</a:t>
+            </a:r>
+          </a:p>
+          <a:p>
+            <a:pPr algn="l">
+              <a:lnSpc>
+                <a:spcPts val="3863"/>
+              </a:lnSpc>
+            </a:pPr>
+            <a:r>
+              <a:rPr lang="en-US" sz="2799">
+                <a:solidFill>
+                  <a:srgbClr val="1F164D"/>
+                </a:solidFill>
+                <a:latin typeface="Arimo"/>
+              </a:rPr>
+              <a:t>Reading diagonals</a:t>
+            </a:r>
+          </a:p>
+          <a:p>
+            <a:pPr algn="l">
+              <a:lnSpc>
+                <a:spcPts val="3863"/>
+              </a:lnSpc>
+            </a:pPr>
+            <a:r>
+              <a:rPr lang="en-US" sz="2799">
+                <a:solidFill>
+                  <a:srgbClr val="1F164D"/>
+                </a:solidFill>
+                <a:latin typeface="Arimo"/>
+              </a:rPr>
+              <a:t>Proppelers implementation</a:t>
             </a:r>
           </a:p>
         </p:txBody>
@@ -6841,8 +7264,8 @@
         </p:nvSpPr>
         <p:spPr>
           <a:xfrm rot="0">
-            <a:off x="12980631" y="4424350"/>
-            <a:ext cx="3775950" cy="707025"/>
+            <a:off x="12746518" y="3889696"/>
+            <a:ext cx="4010063" cy="1241679"/>
           </a:xfrm>
           <a:prstGeom prst="rect">
             <a:avLst/>
@@ -6866,7 +7289,7 @@
                 </a:solidFill>
                 <a:latin typeface="IBM Plex Mono Bold"/>
               </a:rPr>
-              <a:t>JUPITER</a:t>
+              <a:t>Robot reconstruction</a:t>
             </a:r>
           </a:p>
         </p:txBody>
@@ -7081,7 +7504,7 @@
 </p:sld>
 </file>
 
-<file path=ppt/slides/slide11.xml><?xml version="1.0" encoding="utf-8"?>
+<file path=ppt/slides/slide12.xml><?xml version="1.0" encoding="utf-8"?>
 <p:sld xmlns:p="http://schemas.openxmlformats.org/presentationml/2006/main" xmlns:a="http://schemas.openxmlformats.org/drawingml/2006/main" xmlns:r="http://schemas.openxmlformats.org/officeDocument/2006/relationships">
   <p:cSld>
     <p:bg>
@@ -7439,7 +7862,7 @@
 </p:sld>
 </file>
 
-<file path=ppt/slides/slide12.xml><?xml version="1.0" encoding="utf-8"?>
+<file path=ppt/slides/slide13.xml><?xml version="1.0" encoding="utf-8"?>
 <p:sld xmlns:p="http://schemas.openxmlformats.org/presentationml/2006/main" xmlns:a="http://schemas.openxmlformats.org/drawingml/2006/main" xmlns:r="http://schemas.openxmlformats.org/officeDocument/2006/relationships">
   <p:cSld>
     <p:bg>
@@ -13784,8 +14207,8 @@
         </p:nvSpPr>
         <p:spPr>
           <a:xfrm flipH="false" flipV="false" rot="0">
-            <a:off x="-50" y="-27450"/>
-            <a:ext cx="18288002" cy="10314600"/>
+            <a:off x="0" y="0"/>
+            <a:ext cx="18288000" cy="10287000"/>
           </a:xfrm>
           <a:custGeom>
             <a:avLst/>
@@ -13794,18 +14217,18 @@
             <a:cxnLst/>
             <a:rect r="r" b="b" t="t" l="l"/>
             <a:pathLst>
-              <a:path h="10314600" w="18288002">
+              <a:path h="10287000" w="18288000">
                 <a:moveTo>
                   <a:pt x="0" y="0"/>
                 </a:moveTo>
                 <a:lnTo>
-                  <a:pt x="18288002" y="0"/>
-                </a:lnTo>
-                <a:lnTo>
-                  <a:pt x="18288002" y="10314600"/>
-                </a:lnTo>
-                <a:lnTo>
-                  <a:pt x="0" y="10314600"/>
+                  <a:pt x="18288000" y="0"/>
+                </a:lnTo>
+                <a:lnTo>
+                  <a:pt x="18288000" y="10287000"/>
+                </a:lnTo>
+                <a:lnTo>
+                  <a:pt x="0" y="10287000"/>
                 </a:lnTo>
                 <a:lnTo>
                   <a:pt x="0" y="0"/>
@@ -13817,14 +14240,106 @@
           <a:blipFill>
             <a:blip r:embed="rId3"/>
             <a:stretch>
-              <a:fillRect l="0" t="-8420" r="0" b="-8411"/>
+              <a:fillRect l="-13113" t="0" r="-13113" b="0"/>
             </a:stretch>
           </a:blipFill>
         </p:spPr>
       </p:sp>
       <p:sp>
         <p:nvSpPr>
-          <p:cNvPr name="TextBox 3" id="3"/>
+          <p:cNvPr name="Freeform 3" id="3"/>
+          <p:cNvSpPr/>
+          <p:nvPr/>
+        </p:nvSpPr>
+        <p:spPr>
+          <a:xfrm flipH="false" flipV="false" rot="-10800000">
+            <a:off x="2068628" y="2527492"/>
+            <a:ext cx="4935548" cy="925866"/>
+          </a:xfrm>
+          <a:custGeom>
+            <a:avLst/>
+            <a:gdLst/>
+            <a:ahLst/>
+            <a:cxnLst/>
+            <a:rect r="r" b="b" t="t" l="l"/>
+            <a:pathLst>
+              <a:path h="925866" w="4935548">
+                <a:moveTo>
+                  <a:pt x="0" y="0"/>
+                </a:moveTo>
+                <a:lnTo>
+                  <a:pt x="4935548" y="0"/>
+                </a:lnTo>
+                <a:lnTo>
+                  <a:pt x="4935548" y="925866"/>
+                </a:lnTo>
+                <a:lnTo>
+                  <a:pt x="0" y="925866"/>
+                </a:lnTo>
+                <a:lnTo>
+                  <a:pt x="0" y="0"/>
+                </a:lnTo>
+                <a:close/>
+              </a:path>
+            </a:pathLst>
+          </a:custGeom>
+          <a:blipFill>
+            <a:blip r:embed="rId4"/>
+            <a:stretch>
+              <a:fillRect l="0" t="0" r="0" b="0"/>
+            </a:stretch>
+          </a:blipFill>
+        </p:spPr>
+      </p:sp>
+      <p:sp>
+        <p:nvSpPr>
+          <p:cNvPr name="Freeform 4" id="4"/>
+          <p:cNvSpPr/>
+          <p:nvPr/>
+        </p:nvSpPr>
+        <p:spPr>
+          <a:xfrm flipH="false" flipV="false" rot="7117467">
+            <a:off x="13287218" y="-1119402"/>
+            <a:ext cx="7605852" cy="4277350"/>
+          </a:xfrm>
+          <a:custGeom>
+            <a:avLst/>
+            <a:gdLst/>
+            <a:ahLst/>
+            <a:cxnLst/>
+            <a:rect r="r" b="b" t="t" l="l"/>
+            <a:pathLst>
+              <a:path h="4277350" w="7605852">
+                <a:moveTo>
+                  <a:pt x="0" y="0"/>
+                </a:moveTo>
+                <a:lnTo>
+                  <a:pt x="7605852" y="0"/>
+                </a:lnTo>
+                <a:lnTo>
+                  <a:pt x="7605852" y="4277350"/>
+                </a:lnTo>
+                <a:lnTo>
+                  <a:pt x="0" y="4277350"/>
+                </a:lnTo>
+                <a:lnTo>
+                  <a:pt x="0" y="0"/>
+                </a:lnTo>
+                <a:close/>
+              </a:path>
+            </a:pathLst>
+          </a:custGeom>
+          <a:blipFill>
+            <a:blip r:embed="rId5"/>
+            <a:stretch>
+              <a:fillRect l="0" t="0" r="0" b="0"/>
+            </a:stretch>
+          </a:blipFill>
+        </p:spPr>
+      </p:sp>
+      <p:sp>
+        <p:nvSpPr>
+          <p:cNvPr name="TextBox 5" id="5"/>
           <p:cNvSpPr txBox="true"/>
           <p:nvPr/>
         </p:nvSpPr>
@@ -13866,98 +14381,6 @@
             </a:pPr>
           </a:p>
         </p:txBody>
-      </p:sp>
-      <p:sp>
-        <p:nvSpPr>
-          <p:cNvPr name="Freeform 4" id="4"/>
-          <p:cNvSpPr/>
-          <p:nvPr/>
-        </p:nvSpPr>
-        <p:spPr>
-          <a:xfrm flipH="false" flipV="false" rot="-10800000">
-            <a:off x="2068628" y="2527492"/>
-            <a:ext cx="4935548" cy="925866"/>
-          </a:xfrm>
-          <a:custGeom>
-            <a:avLst/>
-            <a:gdLst/>
-            <a:ahLst/>
-            <a:cxnLst/>
-            <a:rect r="r" b="b" t="t" l="l"/>
-            <a:pathLst>
-              <a:path h="925866" w="4935548">
-                <a:moveTo>
-                  <a:pt x="0" y="0"/>
-                </a:moveTo>
-                <a:lnTo>
-                  <a:pt x="4935548" y="0"/>
-                </a:lnTo>
-                <a:lnTo>
-                  <a:pt x="4935548" y="925866"/>
-                </a:lnTo>
-                <a:lnTo>
-                  <a:pt x="0" y="925866"/>
-                </a:lnTo>
-                <a:lnTo>
-                  <a:pt x="0" y="0"/>
-                </a:lnTo>
-                <a:close/>
-              </a:path>
-            </a:pathLst>
-          </a:custGeom>
-          <a:blipFill>
-            <a:blip r:embed="rId4"/>
-            <a:stretch>
-              <a:fillRect l="0" t="0" r="0" b="0"/>
-            </a:stretch>
-          </a:blipFill>
-        </p:spPr>
-      </p:sp>
-      <p:sp>
-        <p:nvSpPr>
-          <p:cNvPr name="Freeform 5" id="5"/>
-          <p:cNvSpPr/>
-          <p:nvPr/>
-        </p:nvSpPr>
-        <p:spPr>
-          <a:xfrm flipH="false" flipV="false" rot="7117467">
-            <a:off x="13287218" y="-1119402"/>
-            <a:ext cx="7605852" cy="4277350"/>
-          </a:xfrm>
-          <a:custGeom>
-            <a:avLst/>
-            <a:gdLst/>
-            <a:ahLst/>
-            <a:cxnLst/>
-            <a:rect r="r" b="b" t="t" l="l"/>
-            <a:pathLst>
-              <a:path h="4277350" w="7605852">
-                <a:moveTo>
-                  <a:pt x="0" y="0"/>
-                </a:moveTo>
-                <a:lnTo>
-                  <a:pt x="7605852" y="0"/>
-                </a:lnTo>
-                <a:lnTo>
-                  <a:pt x="7605852" y="4277350"/>
-                </a:lnTo>
-                <a:lnTo>
-                  <a:pt x="0" y="4277350"/>
-                </a:lnTo>
-                <a:lnTo>
-                  <a:pt x="0" y="0"/>
-                </a:lnTo>
-                <a:close/>
-              </a:path>
-            </a:pathLst>
-          </a:custGeom>
-          <a:blipFill>
-            <a:blip r:embed="rId5"/>
-            <a:stretch>
-              <a:fillRect l="0" t="0" r="0" b="0"/>
-            </a:stretch>
-          </a:blipFill>
-        </p:spPr>
       </p:sp>
     </p:spTree>
   </p:cSld>
@@ -14057,8 +14480,8 @@
         </p:nvSpPr>
         <p:spPr>
           <a:xfrm flipH="false" flipV="false" rot="0">
-            <a:off x="352425" y="316975"/>
-            <a:ext cx="9505950" cy="752500"/>
+            <a:off x="14464350" y="9207998"/>
+            <a:ext cx="3458250" cy="802850"/>
           </a:xfrm>
           <a:custGeom>
             <a:avLst/>
@@ -14067,18 +14490,18 @@
             <a:cxnLst/>
             <a:rect r="r" b="b" t="t" l="l"/>
             <a:pathLst>
-              <a:path h="752500" w="9505950">
+              <a:path h="802850" w="3458250">
                 <a:moveTo>
                   <a:pt x="0" y="0"/>
                 </a:moveTo>
                 <a:lnTo>
-                  <a:pt x="9505950" y="0"/>
-                </a:lnTo>
-                <a:lnTo>
-                  <a:pt x="9505950" y="752500"/>
-                </a:lnTo>
-                <a:lnTo>
-                  <a:pt x="0" y="752500"/>
+                  <a:pt x="3458250" y="0"/>
+                </a:lnTo>
+                <a:lnTo>
+                  <a:pt x="3458250" y="802850"/>
+                </a:lnTo>
+                <a:lnTo>
+                  <a:pt x="0" y="802850"/>
                 </a:lnTo>
                 <a:lnTo>
                   <a:pt x="0" y="0"/>
@@ -14088,13 +14511,7 @@
             </a:pathLst>
           </a:custGeom>
           <a:blipFill>
-            <a:blip r:embed="rId3">
-              <a:extLst>
-                <a:ext uri="{96DAC541-7B7A-43D3-8B79-37D633B846F1}">
-                  <asvg:svgBlip xmlns:asvg="http://schemas.microsoft.com/office/drawing/2016/SVG/main" r:embed="rId4"/>
-                </a:ext>
-              </a:extLst>
-            </a:blip>
+            <a:blip r:embed="rId2"/>
             <a:stretch>
               <a:fillRect l="0" t="0" r="0" b="0"/>
             </a:stretch>
@@ -14103,86 +14520,14 @@
       </p:sp>
       <p:sp>
         <p:nvSpPr>
-          <p:cNvPr name="AutoShape 5" id="5"/>
+          <p:cNvPr name="Freeform 5" id="5"/>
           <p:cNvSpPr/>
           <p:nvPr/>
         </p:nvSpPr>
         <p:spPr>
-          <a:xfrm rot="12410">
-            <a:off x="352408" y="590400"/>
-            <a:ext cx="5276884" cy="0"/>
-          </a:xfrm>
-          <a:prstGeom prst="line">
-            <a:avLst/>
-          </a:prstGeom>
-          <a:ln cap="rnd" w="9525">
-            <a:solidFill>
-              <a:srgbClr val="6F79E3"/>
-            </a:solidFill>
-            <a:prstDash val="solid"/>
-            <a:headEnd type="none" len="sm" w="sm"/>
-            <a:tailEnd type="oval" len="lg" w="lg"/>
-          </a:ln>
-        </p:spPr>
-      </p:sp>
-      <p:sp>
-        <p:nvSpPr>
-          <p:cNvPr name="AutoShape 6" id="6"/>
-          <p:cNvSpPr/>
-          <p:nvPr/>
-        </p:nvSpPr>
-        <p:spPr>
-          <a:xfrm rot="7499405">
-            <a:off x="397397" y="10144050"/>
-            <a:ext cx="2558007" cy="0"/>
-          </a:xfrm>
-          <a:prstGeom prst="line">
-            <a:avLst/>
-          </a:prstGeom>
-          <a:ln cap="rnd" w="9525">
-            <a:solidFill>
-              <a:srgbClr val="6F79E3"/>
-            </a:solidFill>
-            <a:prstDash val="solid"/>
-            <a:headEnd type="none" len="sm" w="sm"/>
-            <a:tailEnd type="oval" len="lg" w="lg"/>
-          </a:ln>
-        </p:spPr>
-      </p:sp>
-      <p:sp>
-        <p:nvSpPr>
-          <p:cNvPr name="AutoShape 7" id="7"/>
-          <p:cNvSpPr/>
-          <p:nvPr/>
-        </p:nvSpPr>
-        <p:spPr>
-          <a:xfrm rot="7499405">
-            <a:off x="-193153" y="10639350"/>
-            <a:ext cx="2558007" cy="0"/>
-          </a:xfrm>
-          <a:prstGeom prst="line">
-            <a:avLst/>
-          </a:prstGeom>
-          <a:ln cap="rnd" w="9525">
-            <a:solidFill>
-              <a:srgbClr val="433ABA"/>
-            </a:solidFill>
-            <a:prstDash val="solid"/>
-            <a:headEnd type="none" len="sm" w="sm"/>
-            <a:tailEnd type="oval" len="lg" w="lg"/>
-          </a:ln>
-        </p:spPr>
-      </p:sp>
-      <p:sp>
-        <p:nvSpPr>
-          <p:cNvPr name="Freeform 8" id="8"/>
-          <p:cNvSpPr/>
-          <p:nvPr/>
-        </p:nvSpPr>
-        <p:spPr>
           <a:xfrm flipH="false" flipV="false" rot="0">
-            <a:off x="361950" y="8376838"/>
-            <a:ext cx="4745052" cy="1624400"/>
+            <a:off x="365400" y="303298"/>
+            <a:ext cx="3458250" cy="802850"/>
           </a:xfrm>
           <a:custGeom>
             <a:avLst/>
@@ -14191,18 +14536,18 @@
             <a:cxnLst/>
             <a:rect r="r" b="b" t="t" l="l"/>
             <a:pathLst>
-              <a:path h="1624400" w="4745052">
+              <a:path h="802850" w="3458250">
                 <a:moveTo>
                   <a:pt x="0" y="0"/>
                 </a:moveTo>
                 <a:lnTo>
-                  <a:pt x="4745052" y="0"/>
-                </a:lnTo>
-                <a:lnTo>
-                  <a:pt x="4745052" y="1624400"/>
-                </a:lnTo>
-                <a:lnTo>
-                  <a:pt x="0" y="1624400"/>
+                  <a:pt x="3458250" y="0"/>
+                </a:lnTo>
+                <a:lnTo>
+                  <a:pt x="3458250" y="802850"/>
+                </a:lnTo>
+                <a:lnTo>
+                  <a:pt x="0" y="802850"/>
                 </a:lnTo>
                 <a:lnTo>
                   <a:pt x="0" y="0"/>
@@ -14212,23 +14557,23 @@
             </a:pathLst>
           </a:custGeom>
           <a:blipFill>
-            <a:blip r:embed="rId5"/>
+            <a:blip r:embed="rId2"/>
             <a:stretch>
-              <a:fillRect l="-4009" t="0" r="-6" b="-11098"/>
+              <a:fillRect l="0" t="0" r="0" b="0"/>
             </a:stretch>
           </a:blipFill>
         </p:spPr>
       </p:sp>
       <p:sp>
         <p:nvSpPr>
-          <p:cNvPr name="Freeform 9" id="9"/>
+          <p:cNvPr name="Freeform 6" id="6"/>
           <p:cNvSpPr/>
           <p:nvPr/>
         </p:nvSpPr>
         <p:spPr>
           <a:xfrm flipH="false" flipV="false" rot="0">
-            <a:off x="7877175" y="1058225"/>
-            <a:ext cx="8994450" cy="8170650"/>
+            <a:off x="1740050" y="802224"/>
+            <a:ext cx="14808048" cy="8682550"/>
           </a:xfrm>
           <a:custGeom>
             <a:avLst/>
@@ -14237,18 +14582,18 @@
             <a:cxnLst/>
             <a:rect r="r" b="b" t="t" l="l"/>
             <a:pathLst>
-              <a:path h="8170650" w="8994450">
+              <a:path h="8682550" w="14808048">
                 <a:moveTo>
                   <a:pt x="0" y="0"/>
                 </a:moveTo>
                 <a:lnTo>
-                  <a:pt x="8994450" y="0"/>
-                </a:lnTo>
-                <a:lnTo>
-                  <a:pt x="8994450" y="8170650"/>
-                </a:lnTo>
-                <a:lnTo>
-                  <a:pt x="0" y="8170650"/>
+                  <a:pt x="14808048" y="0"/>
+                </a:lnTo>
+                <a:lnTo>
+                  <a:pt x="14808048" y="8682550"/>
+                </a:lnTo>
+                <a:lnTo>
+                  <a:pt x="0" y="8682550"/>
                 </a:lnTo>
                 <a:lnTo>
                   <a:pt x="0" y="0"/>
@@ -14258,23 +14603,115 @@
             </a:pathLst>
           </a:custGeom>
           <a:blipFill>
-            <a:blip r:embed="rId6"/>
+            <a:blip r:embed="rId3"/>
             <a:stretch>
-              <a:fillRect l="-13610" t="0" r="-24248" b="0"/>
+              <a:fillRect l="0" t="-1319" r="0" b="1319"/>
             </a:stretch>
           </a:blipFill>
         </p:spPr>
       </p:sp>
       <p:sp>
         <p:nvSpPr>
-          <p:cNvPr name="TextBox 10" id="10"/>
+          <p:cNvPr name="Freeform 7" id="7"/>
+          <p:cNvSpPr/>
+          <p:nvPr/>
+        </p:nvSpPr>
+        <p:spPr>
+          <a:xfrm flipH="false" flipV="false" rot="0">
+            <a:off x="6676328" y="1079018"/>
+            <a:ext cx="4935548" cy="925866"/>
+          </a:xfrm>
+          <a:custGeom>
+            <a:avLst/>
+            <a:gdLst/>
+            <a:ahLst/>
+            <a:cxnLst/>
+            <a:rect r="r" b="b" t="t" l="l"/>
+            <a:pathLst>
+              <a:path h="925866" w="4935548">
+                <a:moveTo>
+                  <a:pt x="0" y="0"/>
+                </a:moveTo>
+                <a:lnTo>
+                  <a:pt x="4935548" y="0"/>
+                </a:lnTo>
+                <a:lnTo>
+                  <a:pt x="4935548" y="925866"/>
+                </a:lnTo>
+                <a:lnTo>
+                  <a:pt x="0" y="925866"/>
+                </a:lnTo>
+                <a:lnTo>
+                  <a:pt x="0" y="0"/>
+                </a:lnTo>
+                <a:close/>
+              </a:path>
+            </a:pathLst>
+          </a:custGeom>
+          <a:blipFill>
+            <a:blip r:embed="rId4"/>
+            <a:stretch>
+              <a:fillRect l="0" t="0" r="0" b="0"/>
+            </a:stretch>
+          </a:blipFill>
+        </p:spPr>
+      </p:sp>
+      <p:sp>
+        <p:nvSpPr>
+          <p:cNvPr name="Freeform 8" id="8"/>
+          <p:cNvSpPr/>
+          <p:nvPr/>
+        </p:nvSpPr>
+        <p:spPr>
+          <a:xfrm flipH="true" flipV="false" rot="-10800000">
+            <a:off x="6676328" y="8282118"/>
+            <a:ext cx="4935548" cy="925866"/>
+          </a:xfrm>
+          <a:custGeom>
+            <a:avLst/>
+            <a:gdLst/>
+            <a:ahLst/>
+            <a:cxnLst/>
+            <a:rect r="r" b="b" t="t" l="l"/>
+            <a:pathLst>
+              <a:path h="925866" w="4935548">
+                <a:moveTo>
+                  <a:pt x="4935548" y="0"/>
+                </a:moveTo>
+                <a:lnTo>
+                  <a:pt x="0" y="0"/>
+                </a:lnTo>
+                <a:lnTo>
+                  <a:pt x="0" y="925866"/>
+                </a:lnTo>
+                <a:lnTo>
+                  <a:pt x="4935548" y="925866"/>
+                </a:lnTo>
+                <a:lnTo>
+                  <a:pt x="4935548" y="0"/>
+                </a:lnTo>
+                <a:close/>
+              </a:path>
+            </a:pathLst>
+          </a:custGeom>
+          <a:blipFill>
+            <a:blip r:embed="rId4"/>
+            <a:stretch>
+              <a:fillRect l="0" t="0" r="0" b="0"/>
+            </a:stretch>
+          </a:blipFill>
+        </p:spPr>
+      </p:sp>
+      <p:sp>
+        <p:nvSpPr>
+          <p:cNvPr name="TextBox 9" id="9"/>
           <p:cNvSpPr txBox="true"/>
           <p:nvPr/>
         </p:nvSpPr>
         <p:spPr>
           <a:xfrm rot="0">
-            <a:off x="1531425" y="974225"/>
-            <a:ext cx="5673150" cy="948309"/>
+            <a:off x="4688625" y="2243009"/>
+            <a:ext cx="8910750" cy="1276350"/>
           </a:xfrm>
           <a:prstGeom prst="rect">
             <a:avLst/>
@@ -14286,33 +14723,33 @@
           </a:bodyPr>
           <a:lstStyle/>
           <a:p>
-            <a:pPr algn="l">
+            <a:pPr algn="ctr">
               <a:lnSpc>
-                <a:spcPts val="7727"/>
+                <a:spcPts val="9599"/>
               </a:lnSpc>
             </a:pPr>
             <a:r>
-              <a:rPr lang="en-US" sz="5599">
+              <a:rPr lang="en-US" sz="9999">
                 <a:solidFill>
                   <a:srgbClr val="1F164D"/>
                 </a:solidFill>
                 <a:latin typeface="IBM Plex Mono Bold"/>
               </a:rPr>
-              <a:t>Results</a:t>
-            </a:r>
-          </a:p>
-        </p:txBody>
-      </p:sp>
-      <p:sp>
-        <p:nvSpPr>
-          <p:cNvPr name="TextBox 11" id="11"/>
+              <a:t>Videos</a:t>
+            </a:r>
+          </a:p>
+        </p:txBody>
+      </p:sp>
+      <p:sp>
+        <p:nvSpPr>
+          <p:cNvPr name="TextBox 10" id="10"/>
           <p:cNvSpPr txBox="true"/>
           <p:nvPr/>
         </p:nvSpPr>
         <p:spPr>
           <a:xfrm rot="0">
-            <a:off x="1531425" y="2007955"/>
-            <a:ext cx="5673150" cy="1715625"/>
+            <a:off x="3059421" y="3405059"/>
+            <a:ext cx="11404929" cy="4291462"/>
           </a:xfrm>
           <a:prstGeom prst="rect">
             <a:avLst/>
@@ -14326,94 +14763,41 @@
           <a:p>
             <a:pPr algn="l">
               <a:lnSpc>
-                <a:spcPts val="3863"/>
+                <a:spcPts val="6825"/>
               </a:lnSpc>
             </a:pPr>
             <a:r>
-              <a:rPr lang="en-US" sz="2799">
+              <a:rPr lang="en-US" sz="4945">
                 <a:solidFill>
                   <a:srgbClr val="1F164D"/>
                 </a:solidFill>
                 <a:latin typeface="Arimo"/>
               </a:rPr>
-              <a:t>Bilder zeigen große Datenmengen, also denke daran: verwende ein Bild statt eines langen Textes</a:t>
-            </a:r>
-          </a:p>
-        </p:txBody>
-      </p:sp>
-      <p:sp>
-        <p:nvSpPr>
-          <p:cNvPr name="TextBox 12" id="12"/>
-          <p:cNvSpPr txBox="true"/>
-          <p:nvPr/>
-        </p:nvSpPr>
-        <p:spPr>
-          <a:xfrm rot="0">
-            <a:off x="1531425" y="3628330"/>
-            <a:ext cx="5673150" cy="948309"/>
-          </a:xfrm>
-          <a:prstGeom prst="rect">
-            <a:avLst/>
-          </a:prstGeom>
-        </p:spPr>
-        <p:txBody>
-          <a:bodyPr anchor="t" rtlCol="false" tIns="0" lIns="0" bIns="0" rIns="0">
-            <a:spAutoFit/>
-          </a:bodyPr>
-          <a:lstStyle/>
+              <a:t>With no adjustments: https://youtu.be/sXtZGCfCFsg</a:t>
+            </a:r>
+          </a:p>
           <a:p>
             <a:pPr algn="l">
               <a:lnSpc>
-                <a:spcPts val="7727"/>
+                <a:spcPts val="6825"/>
               </a:lnSpc>
             </a:pPr>
             <a:r>
-              <a:rPr lang="en-US" sz="5599">
-                <a:solidFill>
-                  <a:srgbClr val="1F164D"/>
-                </a:solidFill>
-                <a:latin typeface="IBM Plex Mono Bold"/>
-              </a:rPr>
-              <a:t>Discussion</a:t>
-            </a:r>
-          </a:p>
-        </p:txBody>
-      </p:sp>
-      <p:sp>
-        <p:nvSpPr>
-          <p:cNvPr name="TextBox 13" id="13"/>
-          <p:cNvSpPr txBox="true"/>
-          <p:nvPr/>
-        </p:nvSpPr>
-        <p:spPr>
-          <a:xfrm rot="0">
-            <a:off x="1531425" y="4662364"/>
-            <a:ext cx="5673150" cy="1715625"/>
-          </a:xfrm>
-          <a:prstGeom prst="rect">
-            <a:avLst/>
-          </a:prstGeom>
-        </p:spPr>
-        <p:txBody>
-          <a:bodyPr anchor="t" rtlCol="false" tIns="0" lIns="0" bIns="0" rIns="0">
-            <a:spAutoFit/>
-          </a:bodyPr>
-          <a:lstStyle/>
-          <a:p>
-            <a:pPr algn="l">
-              <a:lnSpc>
-                <a:spcPts val="3863"/>
-              </a:lnSpc>
-            </a:pPr>
-            <a:r>
-              <a:rPr lang="en-US" sz="2799">
+              <a:rPr lang="en-US" sz="4945">
                 <a:solidFill>
                   <a:srgbClr val="1F164D"/>
                 </a:solidFill>
                 <a:latin typeface="Arimo"/>
               </a:rPr>
-              <a:t>Bilder zeigen große Datenmengen, also denke daran: verwende ein Bild statt eines langen Textes</a:t>
-            </a:r>
+              <a:t>With adjustments: https://youtu.be/ZhKnzUS-r1I</a:t>
+            </a:r>
+          </a:p>
+          <a:p>
+            <a:pPr algn="l">
+              <a:lnSpc>
+                <a:spcPts val="6825"/>
+              </a:lnSpc>
+            </a:pPr>
           </a:p>
         </p:txBody>
       </p:sp>
@@ -14514,9 +14898,9 @@
           <p:nvPr/>
         </p:nvSpPr>
         <p:spPr>
-          <a:xfrm flipH="false" flipV="false" rot="-5400000">
-            <a:off x="14597226" y="-567430"/>
-            <a:ext cx="3720248" cy="3915300"/>
+          <a:xfrm flipH="false" flipV="false" rot="0">
+            <a:off x="352425" y="316975"/>
+            <a:ext cx="9505950" cy="752500"/>
           </a:xfrm>
           <a:custGeom>
             <a:avLst/>
@@ -14525,18 +14909,18 @@
             <a:cxnLst/>
             <a:rect r="r" b="b" t="t" l="l"/>
             <a:pathLst>
-              <a:path h="3915300" w="3720248">
+              <a:path h="752500" w="9505950">
                 <a:moveTo>
                   <a:pt x="0" y="0"/>
                 </a:moveTo>
                 <a:lnTo>
-                  <a:pt x="3720248" y="0"/>
-                </a:lnTo>
-                <a:lnTo>
-                  <a:pt x="3720248" y="3915300"/>
-                </a:lnTo>
-                <a:lnTo>
-                  <a:pt x="0" y="3915300"/>
+                  <a:pt x="9505950" y="0"/>
+                </a:lnTo>
+                <a:lnTo>
+                  <a:pt x="9505950" y="752500"/>
+                </a:lnTo>
+                <a:lnTo>
+                  <a:pt x="0" y="752500"/>
                 </a:lnTo>
                 <a:lnTo>
                   <a:pt x="0" y="0"/>
@@ -14546,7 +14930,13 @@
             </a:pathLst>
           </a:custGeom>
           <a:blipFill>
-            <a:blip r:embed="rId3"/>
+            <a:blip r:embed="rId3">
+              <a:extLst>
+                <a:ext uri="{96DAC541-7B7A-43D3-8B79-37D633B846F1}">
+                  <asvg:svgBlip xmlns:asvg="http://schemas.microsoft.com/office/drawing/2016/SVG/main" r:embed="rId4"/>
+                </a:ext>
+              </a:extLst>
+            </a:blip>
             <a:stretch>
               <a:fillRect l="0" t="0" r="0" b="0"/>
             </a:stretch>
@@ -14555,14 +14945,86 @@
       </p:sp>
       <p:sp>
         <p:nvSpPr>
-          <p:cNvPr name="Freeform 5" id="5"/>
+          <p:cNvPr name="AutoShape 5" id="5"/>
           <p:cNvSpPr/>
           <p:nvPr/>
         </p:nvSpPr>
         <p:spPr>
-          <a:xfrm flipH="false" flipV="false" rot="-10800000">
-            <a:off x="365404" y="9343840"/>
-            <a:ext cx="2222302" cy="864466"/>
+          <a:xfrm rot="12410">
+            <a:off x="352408" y="590400"/>
+            <a:ext cx="5276884" cy="0"/>
+          </a:xfrm>
+          <a:prstGeom prst="line">
+            <a:avLst/>
+          </a:prstGeom>
+          <a:ln cap="rnd" w="9525">
+            <a:solidFill>
+              <a:srgbClr val="6F79E3"/>
+            </a:solidFill>
+            <a:prstDash val="solid"/>
+            <a:headEnd type="none" len="sm" w="sm"/>
+            <a:tailEnd type="oval" len="lg" w="lg"/>
+          </a:ln>
+        </p:spPr>
+      </p:sp>
+      <p:sp>
+        <p:nvSpPr>
+          <p:cNvPr name="AutoShape 6" id="6"/>
+          <p:cNvSpPr/>
+          <p:nvPr/>
+        </p:nvSpPr>
+        <p:spPr>
+          <a:xfrm rot="7499405">
+            <a:off x="397397" y="10144050"/>
+            <a:ext cx="2558007" cy="0"/>
+          </a:xfrm>
+          <a:prstGeom prst="line">
+            <a:avLst/>
+          </a:prstGeom>
+          <a:ln cap="rnd" w="9525">
+            <a:solidFill>
+              <a:srgbClr val="6F79E3"/>
+            </a:solidFill>
+            <a:prstDash val="solid"/>
+            <a:headEnd type="none" len="sm" w="sm"/>
+            <a:tailEnd type="oval" len="lg" w="lg"/>
+          </a:ln>
+        </p:spPr>
+      </p:sp>
+      <p:sp>
+        <p:nvSpPr>
+          <p:cNvPr name="AutoShape 7" id="7"/>
+          <p:cNvSpPr/>
+          <p:nvPr/>
+        </p:nvSpPr>
+        <p:spPr>
+          <a:xfrm rot="7499405">
+            <a:off x="-193153" y="10639350"/>
+            <a:ext cx="2558007" cy="0"/>
+          </a:xfrm>
+          <a:prstGeom prst="line">
+            <a:avLst/>
+          </a:prstGeom>
+          <a:ln cap="rnd" w="9525">
+            <a:solidFill>
+              <a:srgbClr val="433ABA"/>
+            </a:solidFill>
+            <a:prstDash val="solid"/>
+            <a:headEnd type="none" len="sm" w="sm"/>
+            <a:tailEnd type="oval" len="lg" w="lg"/>
+          </a:ln>
+        </p:spPr>
+      </p:sp>
+      <p:sp>
+        <p:nvSpPr>
+          <p:cNvPr name="Freeform 8" id="8"/>
+          <p:cNvSpPr/>
+          <p:nvPr/>
+        </p:nvSpPr>
+        <p:spPr>
+          <a:xfrm flipH="false" flipV="false" rot="0">
+            <a:off x="361950" y="8376838"/>
+            <a:ext cx="4745052" cy="1624400"/>
           </a:xfrm>
           <a:custGeom>
             <a:avLst/>
@@ -14571,113 +15033,21 @@
             <a:cxnLst/>
             <a:rect r="r" b="b" t="t" l="l"/>
             <a:pathLst>
-              <a:path h="864466" w="2222302">
+              <a:path h="1624400" w="4745052">
                 <a:moveTo>
                   <a:pt x="0" y="0"/>
                 </a:moveTo>
                 <a:lnTo>
-                  <a:pt x="2222302" y="0"/>
-                </a:lnTo>
-                <a:lnTo>
-                  <a:pt x="2222302" y="864466"/>
-                </a:lnTo>
-                <a:lnTo>
-                  <a:pt x="0" y="864466"/>
-                </a:lnTo>
-                <a:lnTo>
-                  <a:pt x="0" y="0"/>
-                </a:lnTo>
-                <a:close/>
-              </a:path>
-            </a:pathLst>
-          </a:custGeom>
-          <a:blipFill>
-            <a:blip r:embed="rId4"/>
-            <a:stretch>
-              <a:fillRect l="0" t="0" r="-107369" b="-3"/>
-            </a:stretch>
-          </a:blipFill>
-        </p:spPr>
-      </p:sp>
-      <p:sp>
-        <p:nvSpPr>
-          <p:cNvPr name="Freeform 6" id="6"/>
-          <p:cNvSpPr/>
-          <p:nvPr/>
-        </p:nvSpPr>
-        <p:spPr>
-          <a:xfrm flipH="false" flipV="false" rot="-10800000">
-            <a:off x="365406" y="9098744"/>
-            <a:ext cx="2637328" cy="864513"/>
-          </a:xfrm>
-          <a:custGeom>
-            <a:avLst/>
-            <a:gdLst/>
-            <a:ahLst/>
-            <a:cxnLst/>
-            <a:rect r="r" b="b" t="t" l="l"/>
-            <a:pathLst>
-              <a:path h="864513" w="2637328">
-                <a:moveTo>
-                  <a:pt x="0" y="0"/>
-                </a:moveTo>
-                <a:lnTo>
-                  <a:pt x="2637328" y="0"/>
-                </a:lnTo>
-                <a:lnTo>
-                  <a:pt x="2637328" y="864513"/>
-                </a:lnTo>
-                <a:lnTo>
-                  <a:pt x="0" y="864513"/>
-                </a:lnTo>
-                <a:lnTo>
-                  <a:pt x="0" y="0"/>
-                </a:lnTo>
-                <a:close/>
-              </a:path>
-            </a:pathLst>
-          </a:custGeom>
-          <a:blipFill>
-            <a:blip r:embed="rId4"/>
-            <a:stretch>
-              <a:fillRect l="0" t="2239" r="-74739" b="-2239"/>
-            </a:stretch>
-          </a:blipFill>
-        </p:spPr>
-      </p:sp>
-      <p:sp>
-        <p:nvSpPr>
-          <p:cNvPr name="Freeform 7" id="7"/>
-          <p:cNvSpPr/>
-          <p:nvPr/>
-        </p:nvSpPr>
-        <p:spPr>
-          <a:xfrm flipH="true" flipV="false" rot="0">
-            <a:off x="10591798" y="7662400"/>
-            <a:ext cx="7708902" cy="2624600"/>
-          </a:xfrm>
-          <a:custGeom>
-            <a:avLst/>
-            <a:gdLst/>
-            <a:ahLst/>
-            <a:cxnLst/>
-            <a:rect r="r" b="b" t="t" l="l"/>
-            <a:pathLst>
-              <a:path h="2624600" w="7708902">
-                <a:moveTo>
-                  <a:pt x="7708902" y="0"/>
-                </a:moveTo>
-                <a:lnTo>
-                  <a:pt x="0" y="0"/>
-                </a:lnTo>
-                <a:lnTo>
-                  <a:pt x="0" y="2624600"/>
-                </a:lnTo>
-                <a:lnTo>
-                  <a:pt x="7708902" y="2624600"/>
-                </a:lnTo>
-                <a:lnTo>
-                  <a:pt x="7708902" y="0"/>
+                  <a:pt x="4745052" y="0"/>
+                </a:lnTo>
+                <a:lnTo>
+                  <a:pt x="4745052" y="1624400"/>
+                </a:lnTo>
+                <a:lnTo>
+                  <a:pt x="0" y="1624400"/>
+                </a:lnTo>
+                <a:lnTo>
+                  <a:pt x="0" y="0"/>
                 </a:lnTo>
                 <a:close/>
               </a:path>
@@ -14686,21 +15056,113 @@
           <a:blipFill>
             <a:blip r:embed="rId5"/>
             <a:stretch>
-              <a:fillRect l="-1979" t="0" r="0" b="-9522"/>
+              <a:fillRect l="-4009" t="0" r="-6" b="-11098"/>
             </a:stretch>
           </a:blipFill>
         </p:spPr>
       </p:sp>
       <p:sp>
         <p:nvSpPr>
-          <p:cNvPr name="TextBox 8" id="8"/>
+          <p:cNvPr name="Freeform 9" id="9"/>
+          <p:cNvSpPr/>
+          <p:nvPr/>
+        </p:nvSpPr>
+        <p:spPr>
+          <a:xfrm flipH="false" flipV="false" rot="0">
+            <a:off x="7854268" y="3646961"/>
+            <a:ext cx="9657352" cy="2993078"/>
+          </a:xfrm>
+          <a:custGeom>
+            <a:avLst/>
+            <a:gdLst/>
+            <a:ahLst/>
+            <a:cxnLst/>
+            <a:rect r="r" b="b" t="t" l="l"/>
+            <a:pathLst>
+              <a:path h="2993078" w="9657352">
+                <a:moveTo>
+                  <a:pt x="0" y="0"/>
+                </a:moveTo>
+                <a:lnTo>
+                  <a:pt x="9657352" y="0"/>
+                </a:lnTo>
+                <a:lnTo>
+                  <a:pt x="9657352" y="2993078"/>
+                </a:lnTo>
+                <a:lnTo>
+                  <a:pt x="0" y="2993078"/>
+                </a:lnTo>
+                <a:lnTo>
+                  <a:pt x="0" y="0"/>
+                </a:lnTo>
+                <a:close/>
+              </a:path>
+            </a:pathLst>
+          </a:custGeom>
+          <a:blipFill>
+            <a:blip r:embed="rId6"/>
+            <a:stretch>
+              <a:fillRect l="0" t="0" r="0" b="0"/>
+            </a:stretch>
+          </a:blipFill>
+        </p:spPr>
+      </p:sp>
+      <p:sp>
+        <p:nvSpPr>
+          <p:cNvPr name="Freeform 10" id="10"/>
+          <p:cNvSpPr/>
+          <p:nvPr/>
+        </p:nvSpPr>
+        <p:spPr>
+          <a:xfrm flipH="false" flipV="false" rot="0">
+            <a:off x="10949238" y="373728"/>
+            <a:ext cx="3467412" cy="3097613"/>
+          </a:xfrm>
+          <a:custGeom>
+            <a:avLst/>
+            <a:gdLst/>
+            <a:ahLst/>
+            <a:cxnLst/>
+            <a:rect r="r" b="b" t="t" l="l"/>
+            <a:pathLst>
+              <a:path h="3097613" w="3467412">
+                <a:moveTo>
+                  <a:pt x="0" y="0"/>
+                </a:moveTo>
+                <a:lnTo>
+                  <a:pt x="3467412" y="0"/>
+                </a:lnTo>
+                <a:lnTo>
+                  <a:pt x="3467412" y="3097612"/>
+                </a:lnTo>
+                <a:lnTo>
+                  <a:pt x="0" y="3097612"/>
+                </a:lnTo>
+                <a:lnTo>
+                  <a:pt x="0" y="0"/>
+                </a:lnTo>
+                <a:close/>
+              </a:path>
+            </a:pathLst>
+          </a:custGeom>
+          <a:blipFill>
+            <a:blip r:embed="rId7"/>
+            <a:stretch>
+              <a:fillRect l="0" t="0" r="0" b="0"/>
+            </a:stretch>
+          </a:blipFill>
+        </p:spPr>
+      </p:sp>
+      <p:sp>
+        <p:nvSpPr>
+          <p:cNvPr name="TextBox 11" id="11"/>
           <p:cNvSpPr txBox="true"/>
           <p:nvPr/>
         </p:nvSpPr>
         <p:spPr>
           <a:xfrm rot="0">
-            <a:off x="1531425" y="1584725"/>
-            <a:ext cx="9527550" cy="948309"/>
+            <a:off x="1531425" y="974225"/>
+            <a:ext cx="5673150" cy="948309"/>
           </a:xfrm>
           <a:prstGeom prst="rect">
             <a:avLst/>
@@ -14724,21 +15186,21 @@
                 </a:solidFill>
                 <a:latin typeface="IBM Plex Mono Bold"/>
               </a:rPr>
-              <a:t>Conclusions</a:t>
-            </a:r>
-          </a:p>
-        </p:txBody>
-      </p:sp>
-      <p:sp>
-        <p:nvSpPr>
-          <p:cNvPr name="TextBox 9" id="9"/>
+              <a:t>Results</a:t>
+            </a:r>
+          </a:p>
+        </p:txBody>
+      </p:sp>
+      <p:sp>
+        <p:nvSpPr>
+          <p:cNvPr name="TextBox 12" id="12"/>
           <p:cNvSpPr txBox="true"/>
           <p:nvPr/>
         </p:nvSpPr>
         <p:spPr>
           <a:xfrm rot="0">
-            <a:off x="1531425" y="3996850"/>
-            <a:ext cx="9527550" cy="3403092"/>
+            <a:off x="1028700" y="2007955"/>
+            <a:ext cx="6456810" cy="2431542"/>
           </a:xfrm>
           <a:prstGeom prst="rect">
             <a:avLst/>
@@ -14750,7 +15212,7 @@
           </a:bodyPr>
           <a:lstStyle/>
           <a:p>
-            <a:pPr algn="r" marL="604519" indent="-302260" lvl="1">
+            <a:pPr algn="l" marL="604519" indent="-302260" lvl="1">
               <a:lnSpc>
                 <a:spcPts val="3863"/>
               </a:lnSpc>
@@ -14764,11 +15226,11 @@
                 </a:solidFill>
                 <a:latin typeface="Arimo"/>
               </a:rPr>
-              <a:t>1</a:t>
-            </a:r>
-          </a:p>
-          <a:p>
-            <a:pPr algn="r" marL="604519" indent="-302260" lvl="1">
+              <a:t>Comparison with algorithms: Wall following, depth first search, breadth first search.</a:t>
+            </a:r>
+          </a:p>
+          <a:p>
+            <a:pPr algn="l" marL="604519" indent="-302260" lvl="1">
               <a:lnSpc>
                 <a:spcPts val="3863"/>
               </a:lnSpc>
@@ -14782,11 +15244,78 @@
                 </a:solidFill>
                 <a:latin typeface="Arimo"/>
               </a:rPr>
-              <a:t>1</a:t>
-            </a:r>
-          </a:p>
-          <a:p>
-            <a:pPr algn="r" marL="604519" indent="-302260" lvl="1">
+              <a:t>Hardware difficulties</a:t>
+            </a:r>
+          </a:p>
+          <a:p>
+            <a:pPr algn="l">
+              <a:lnSpc>
+                <a:spcPts val="3863"/>
+              </a:lnSpc>
+            </a:pPr>
+          </a:p>
+        </p:txBody>
+      </p:sp>
+      <p:sp>
+        <p:nvSpPr>
+          <p:cNvPr name="TextBox 13" id="13"/>
+          <p:cNvSpPr txBox="true"/>
+          <p:nvPr/>
+        </p:nvSpPr>
+        <p:spPr>
+          <a:xfrm rot="0">
+            <a:off x="1531425" y="4195191"/>
+            <a:ext cx="5673150" cy="948309"/>
+          </a:xfrm>
+          <a:prstGeom prst="rect">
+            <a:avLst/>
+          </a:prstGeom>
+        </p:spPr>
+        <p:txBody>
+          <a:bodyPr anchor="t" rtlCol="false" tIns="0" lIns="0" bIns="0" rIns="0">
+            <a:spAutoFit/>
+          </a:bodyPr>
+          <a:lstStyle/>
+          <a:p>
+            <a:pPr algn="l">
+              <a:lnSpc>
+                <a:spcPts val="7727"/>
+              </a:lnSpc>
+            </a:pPr>
+            <a:r>
+              <a:rPr lang="en-US" sz="5599">
+                <a:solidFill>
+                  <a:srgbClr val="1F164D"/>
+                </a:solidFill>
+                <a:latin typeface="IBM Plex Mono Bold"/>
+              </a:rPr>
+              <a:t>Discussion</a:t>
+            </a:r>
+          </a:p>
+        </p:txBody>
+      </p:sp>
+      <p:sp>
+        <p:nvSpPr>
+          <p:cNvPr name="TextBox 14" id="14"/>
+          <p:cNvSpPr txBox="true"/>
+          <p:nvPr/>
+        </p:nvSpPr>
+        <p:spPr>
+          <a:xfrm rot="0">
+            <a:off x="1028700" y="5159059"/>
+            <a:ext cx="6456810" cy="1945767"/>
+          </a:xfrm>
+          <a:prstGeom prst="rect">
+            <a:avLst/>
+          </a:prstGeom>
+        </p:spPr>
+        <p:txBody>
+          <a:bodyPr anchor="t" rtlCol="false" tIns="0" lIns="0" bIns="0" rIns="0">
+            <a:spAutoFit/>
+          </a:bodyPr>
+          <a:lstStyle/>
+          <a:p>
+            <a:pPr algn="l" marL="604519" indent="-302260" lvl="1">
               <a:lnSpc>
                 <a:spcPts val="3863"/>
               </a:lnSpc>
@@ -14800,11 +15329,11 @@
                 </a:solidFill>
                 <a:latin typeface="Arimo"/>
               </a:rPr>
-              <a:t>3</a:t>
-            </a:r>
-          </a:p>
-          <a:p>
-            <a:pPr algn="r" marL="604519" indent="-302260" lvl="1">
+              <a:t>Efficiency as an algorithm</a:t>
+            </a:r>
+          </a:p>
+          <a:p>
+            <a:pPr algn="l" marL="604519" indent="-302260" lvl="1">
               <a:lnSpc>
                 <a:spcPts val="3863"/>
               </a:lnSpc>
@@ -14818,31 +15347,44 @@
                 </a:solidFill>
                 <a:latin typeface="Arimo"/>
               </a:rPr>
-              <a:t>4</a:t>
-            </a:r>
-          </a:p>
-          <a:p>
-            <a:pPr algn="r" marL="604519" indent="-302260" lvl="1">
+              <a:t>Simplicity in hardware</a:t>
+            </a:r>
+          </a:p>
+          <a:p>
+            <a:pPr algn="l" marL="604519" indent="-302260" lvl="1">
               <a:lnSpc>
                 <a:spcPts val="3863"/>
               </a:lnSpc>
               <a:buFont typeface="Arial"/>
               <a:buChar char="•"/>
             </a:pPr>
-          </a:p>
-          <a:p>
-            <a:pPr algn="r">
+            <a:r>
+              <a:rPr lang="en-US" sz="2799">
+                <a:solidFill>
+                  <a:srgbClr val="1F164D"/>
+                </a:solidFill>
+                <a:latin typeface="Arimo"/>
+              </a:rPr>
+              <a:t>Environment conditions</a:t>
+            </a:r>
+          </a:p>
+          <a:p>
+            <a:pPr algn="l" marL="604519" indent="-302260" lvl="1">
               <a:lnSpc>
                 <a:spcPts val="3863"/>
               </a:lnSpc>
+              <a:buFont typeface="Arial"/>
+              <a:buChar char="•"/>
             </a:pPr>
-          </a:p>
-          <a:p>
-            <a:pPr algn="r">
-              <a:lnSpc>
-                <a:spcPts val="3863"/>
-              </a:lnSpc>
-            </a:pPr>
+            <a:r>
+              <a:rPr lang="en-US" sz="2799">
+                <a:solidFill>
+                  <a:srgbClr val="1F164D"/>
+                </a:solidFill>
+                <a:latin typeface="Arimo"/>
+              </a:rPr>
+              <a:t>Methods for callibration</a:t>
+            </a:r>
           </a:p>
         </p:txBody>
       </p:sp>

</xml_diff>

<commit_message>
Minor adjustments pptx. Pptx and video done
</commit_message>
<xml_diff>
--- a/Flood-Fill Algorithm for Maze Solving.pptx
+++ b/Flood-Fill Algorithm for Maze Solving.pptx
@@ -5767,7 +5767,7 @@
         </p:nvGrpSpPr>
         <p:grpSpPr>
           <a:xfrm rot="0">
-            <a:off x="365400" y="303300"/>
+            <a:off x="384450" y="303300"/>
             <a:ext cx="17557200" cy="9680400"/>
             <a:chOff x="0" y="0"/>
             <a:chExt cx="23409600" cy="12907200"/>
@@ -6645,7 +6645,7 @@
                 </a:solidFill>
                 <a:latin typeface="Arimo"/>
               </a:rPr>
-              <a:t>The usage of an Arduino Nano allows us to reduce the size of the robot in future related implementations and also gives the opportunity to include more sensors and modules to ensure a better control of the robot’s repositioning and increase its efficiency.</a:t>
+              <a:t>The use of an Arduino Nano allows us to reduce the size of the robot in future related implementations and also gives us the opportunity to include more sensors and modules to ensure a better control of the robot’s repositioning and increase its efficiency.</a:t>
             </a:r>
           </a:p>
           <a:p>
@@ -10887,7 +10887,7 @@
         </p:nvGrpSpPr>
         <p:grpSpPr>
           <a:xfrm rot="0">
-            <a:off x="365400" y="303300"/>
+            <a:off x="384450" y="303300"/>
             <a:ext cx="17557200" cy="9680400"/>
             <a:chOff x="0" y="0"/>
             <a:chExt cx="23409600" cy="12907200"/>
@@ -11835,7 +11835,7 @@
         </p:nvGrpSpPr>
         <p:grpSpPr>
           <a:xfrm rot="0">
-            <a:off x="365400" y="303300"/>
+            <a:off x="384723" y="303300"/>
             <a:ext cx="17557200" cy="9680400"/>
             <a:chOff x="0" y="0"/>
             <a:chExt cx="23409600" cy="12907200"/>
@@ -12844,7 +12844,7 @@
                           </a:solidFill>
                           <a:latin typeface="Arimo"/>
                         </a:rPr>
-                        <a:t>Chasis of the robot and terminal block shield</a:t>
+                        <a:t>Robot chassis and a terminal block shield for Nano</a:t>
                       </a:r>
                       <a:endParaRPr lang="en-US" sz="1100"/>
                     </a:p>

</xml_diff>